<commit_message>
Added London specific Accessibility Testing presentation
</commit_message>
<xml_diff>
--- a/Presenations/2024 Presentations/AccessibilityTesting101 - London NDC.pptx
+++ b/Presenations/2024 Presentations/AccessibilityTesting101 - London NDC.pptx
@@ -6027,7 +6027,7 @@
           <a:p>
             <a:fld id="{BEFAACEF-CC9A-483E-9B56-DECAFB57975A}" type="datetimeFigureOut">
               <a:rPr lang="en-US" smtClean="0"/>
-              <a:t>10/3/2023</a:t>
+              <a:t>10/14/2023</a:t>
             </a:fld>
             <a:endParaRPr lang="en-US"/>
           </a:p>
@@ -8088,7 +8088,7 @@
           <a:p>
             <a:fld id="{BA049CC4-5A97-47DC-86B9-9927E3A2D5F5}" type="datetime1">
               <a:rPr lang="en-US" smtClean="0"/>
-              <a:t>10/3/2023</a:t>
+              <a:t>10/14/2023</a:t>
             </a:fld>
             <a:endParaRPr lang="en-US"/>
           </a:p>
@@ -8360,7 +8360,7 @@
           <a:p>
             <a:fld id="{08A11C66-9C87-4BA8-9534-5EF145E66FE7}" type="datetime1">
               <a:rPr lang="en-US" smtClean="0"/>
-              <a:t>10/3/2023</a:t>
+              <a:t>10/14/2023</a:t>
             </a:fld>
             <a:endParaRPr lang="en-US"/>
           </a:p>
@@ -8591,7 +8591,7 @@
           <a:p>
             <a:fld id="{5AE480A1-3E8F-4FEB-9473-F28D5BA2CE2F}" type="datetime1">
               <a:rPr lang="en-US" smtClean="0"/>
-              <a:t>10/3/2023</a:t>
+              <a:t>10/14/2023</a:t>
             </a:fld>
             <a:endParaRPr lang="en-US"/>
           </a:p>
@@ -8901,7 +8901,7 @@
           <a:p>
             <a:fld id="{51941244-449B-4313-BB5D-CEC8D390AC83}" type="datetime1">
               <a:rPr lang="en-US" smtClean="0"/>
-              <a:t>10/3/2023</a:t>
+              <a:t>10/14/2023</a:t>
             </a:fld>
             <a:endParaRPr lang="en-US"/>
           </a:p>
@@ -9374,7 +9374,7 @@
           <a:p>
             <a:fld id="{D3AAB994-AF9D-407F-AC45-491F65672FB8}" type="datetime1">
               <a:rPr lang="en-US" smtClean="0"/>
-              <a:t>10/3/2023</a:t>
+              <a:t>10/14/2023</a:t>
             </a:fld>
             <a:endParaRPr lang="en-US"/>
           </a:p>
@@ -9921,7 +9921,7 @@
           <a:p>
             <a:fld id="{95B69CAA-71E9-4E32-8F4F-8B1877E6E416}" type="datetime1">
               <a:rPr lang="en-US" smtClean="0"/>
-              <a:t>10/3/2023</a:t>
+              <a:t>10/14/2023</a:t>
             </a:fld>
             <a:endParaRPr lang="en-US"/>
           </a:p>
@@ -10695,7 +10695,7 @@
           <a:p>
             <a:fld id="{4F1F7796-6626-4944-B793-E85205E429DA}" type="datetime1">
               <a:rPr lang="en-US" smtClean="0"/>
-              <a:t>10/3/2023</a:t>
+              <a:t>10/14/2023</a:t>
             </a:fld>
             <a:endParaRPr lang="en-US"/>
           </a:p>
@@ -10870,7 +10870,7 @@
           <a:p>
             <a:fld id="{275BEE86-0E69-41D4-B130-484F9582CF68}" type="datetime1">
               <a:rPr lang="en-US" smtClean="0"/>
-              <a:t>10/3/2023</a:t>
+              <a:t>10/14/2023</a:t>
             </a:fld>
             <a:endParaRPr lang="en-US"/>
           </a:p>
@@ -11093,7 +11093,7 @@
           <a:p>
             <a:fld id="{E8E2E543-8735-43A9-800E-D52D2E6A7570}" type="datetime1">
               <a:rPr lang="en-US" smtClean="0"/>
-              <a:t>10/3/2023</a:t>
+              <a:t>10/14/2023</a:t>
             </a:fld>
             <a:endParaRPr lang="en-US"/>
           </a:p>
@@ -11278,7 +11278,7 @@
           <a:p>
             <a:fld id="{4F562C0E-85F8-4032-A4AC-EAAA621EB697}" type="datetime1">
               <a:rPr lang="en-US" smtClean="0"/>
-              <a:t>10/3/2023</a:t>
+              <a:t>10/14/2023</a:t>
             </a:fld>
             <a:endParaRPr lang="en-US"/>
           </a:p>
@@ -11567,7 +11567,7 @@
           <a:p>
             <a:fld id="{4D4D2949-E030-4779-99B3-FAC018E20B72}" type="datetime1">
               <a:rPr lang="en-US" smtClean="0"/>
-              <a:t>10/3/2023</a:t>
+              <a:t>10/14/2023</a:t>
             </a:fld>
             <a:endParaRPr lang="en-US"/>
           </a:p>
@@ -11814,7 +11814,7 @@
           <a:p>
             <a:fld id="{0F3F8BCC-FB76-4EC4-8AAF-4B5BA4B75FEF}" type="datetime1">
               <a:rPr lang="en-US" smtClean="0"/>
-              <a:t>10/3/2023</a:t>
+              <a:t>10/14/2023</a:t>
             </a:fld>
             <a:endParaRPr lang="en-US"/>
           </a:p>
@@ -12193,7 +12193,7 @@
           <a:p>
             <a:fld id="{7AB60B1E-0147-4747-AD07-17141088A4C3}" type="datetime1">
               <a:rPr lang="en-US" smtClean="0"/>
-              <a:t>10/3/2023</a:t>
+              <a:t>10/14/2023</a:t>
             </a:fld>
             <a:endParaRPr lang="en-US"/>
           </a:p>
@@ -12311,7 +12311,7 @@
           <a:p>
             <a:fld id="{122DC7E5-9295-4EB3-8473-59EEBBFB2383}" type="datetime1">
               <a:rPr lang="en-US" smtClean="0"/>
-              <a:t>10/3/2023</a:t>
+              <a:t>10/14/2023</a:t>
             </a:fld>
             <a:endParaRPr lang="en-US"/>
           </a:p>
@@ -12406,7 +12406,7 @@
           <a:p>
             <a:fld id="{915BDD53-BBE8-4710-8261-574287A899BD}" type="datetime1">
               <a:rPr lang="en-US" smtClean="0"/>
-              <a:t>10/3/2023</a:t>
+              <a:t>10/14/2023</a:t>
             </a:fld>
             <a:endParaRPr lang="en-US"/>
           </a:p>
@@ -12655,7 +12655,7 @@
           <a:p>
             <a:fld id="{68C84FA3-F6D9-4634-9C02-2941F1994736}" type="datetime1">
               <a:rPr lang="en-US" smtClean="0"/>
-              <a:t>10/3/2023</a:t>
+              <a:t>10/14/2023</a:t>
             </a:fld>
             <a:endParaRPr lang="en-US"/>
           </a:p>
@@ -12912,7 +12912,7 @@
           <a:p>
             <a:fld id="{DAC35DB0-0D5A-4AF5-B91D-F5AC233569C2}" type="datetime1">
               <a:rPr lang="en-US" smtClean="0"/>
-              <a:t>10/3/2023</a:t>
+              <a:t>10/14/2023</a:t>
             </a:fld>
             <a:endParaRPr lang="en-US"/>
           </a:p>
@@ -13155,7 +13155,7 @@
           <a:p>
             <a:fld id="{22AFDDC1-071C-48BE-AEB0-C522838D21A3}" type="datetime1">
               <a:rPr lang="en-US" smtClean="0"/>
-              <a:t>10/3/2023</a:t>
+              <a:t>10/14/2023</a:t>
             </a:fld>
             <a:endParaRPr lang="en-US"/>
           </a:p>
@@ -14742,47 +14742,23 @@
           <a:p>
             <a:r>
               <a:rPr lang="en-US" sz="1600" b="1" dirty="0">
-                <a:solidFill>
-                  <a:schemeClr val="accent6">
-                    <a:lumMod val="60000"/>
-                    <a:lumOff val="40000"/>
-                  </a:schemeClr>
-                </a:solidFill>
-                <a:hlinkClick r:id="rId3">
-                  <a:extLst>
-                    <a:ext uri="{A12FA001-AC4F-418D-AE19-62706E023703}">
-                      <ahyp:hlinkClr xmlns:ahyp="http://schemas.microsoft.com/office/drawing/2018/hyperlinkcolor" val="tx"/>
-                    </a:ext>
-                  </a:extLst>
-                </a:hlinkClick>
+                <a:hlinkClick r:id="rId3"/>
               </a:rPr>
-              <a:t>Accessibility Insights</a:t>
+              <a:t>BBC Accessibility Help </a:t>
             </a:r>
             <a:r>
               <a:rPr lang="en-US" sz="1600" dirty="0"/>
-              <a:t> – Accessibility testing tool made by Microsoft</a:t>
-            </a:r>
-          </a:p>
-          <a:p>
-            <a:pPr lvl="1"/>
-            <a:r>
-              <a:rPr lang="en-US" sz="1600" dirty="0"/>
-              <a:t>Has browser extension and desktop application versions</a:t>
-            </a:r>
-          </a:p>
-          <a:p>
-            <a:pPr lvl="1"/>
-            <a:r>
-              <a:rPr lang="en-US" sz="1600" dirty="0"/>
-              <a:t>Also have the option to include the automated tests in CI/CD</a:t>
-            </a:r>
-          </a:p>
-          <a:p>
-            <a:pPr lvl="1"/>
-            <a:r>
-              <a:rPr lang="en-US" sz="1600" dirty="0"/>
-              <a:t>DON’T depend on automated tests</a:t>
-            </a:r>
+              <a:t>- d</a:t>
+            </a:r>
+            <a:endParaRPr lang="en-US" sz="1600" dirty="0">
+              <a:hlinkClick r:id="rId4">
+                <a:extLst>
+                  <a:ext uri="{A12FA001-AC4F-418D-AE19-62706E023703}">
+                    <ahyp:hlinkClr xmlns:ahyp="http://schemas.microsoft.com/office/drawing/2018/hyperlinkcolor" val="tx"/>
+                  </a:ext>
+                </a:extLst>
+              </a:hlinkClick>
+            </a:endParaRPr>
           </a:p>
           <a:p>
             <a:r>
@@ -14801,19 +14777,35 @@
                   </a:extLst>
                 </a:hlinkClick>
               </a:rPr>
-              <a:t>NVDA</a:t>
+              <a:t>Accessibility Insights</a:t>
             </a:r>
             <a:r>
               <a:rPr lang="en-US" sz="1600" dirty="0"/>
-              <a:t> – free, open-sourced screen reader</a:t>
+              <a:t> – Accessibility testing tool made by Microsoft</a:t>
             </a:r>
           </a:p>
           <a:p>
             <a:pPr lvl="1"/>
             <a:r>
               <a:rPr lang="en-US" sz="1600" dirty="0"/>
-              <a:t>View keyboard shortcuts on at the Deque article entitled: </a:t>
-            </a:r>
+              <a:t>Has browser extension and desktop application versions</a:t>
+            </a:r>
+          </a:p>
+          <a:p>
+            <a:pPr lvl="1"/>
+            <a:r>
+              <a:rPr lang="en-US" sz="1600" dirty="0"/>
+              <a:t>Also have the option to include the automated tests in CI/CD</a:t>
+            </a:r>
+          </a:p>
+          <a:p>
+            <a:pPr lvl="1"/>
+            <a:r>
+              <a:rPr lang="en-US" sz="1600" dirty="0"/>
+              <a:t>DON’T depend on automated tests</a:t>
+            </a:r>
+          </a:p>
+          <a:p>
             <a:r>
               <a:rPr lang="en-US" sz="1600" b="1" dirty="0">
                 <a:solidFill>
@@ -14830,35 +14822,18 @@
                   </a:extLst>
                 </a:hlinkClick>
               </a:rPr>
-              <a:t>NVDA Keyboard Shortcuts</a:t>
-            </a:r>
-            <a:r>
-              <a:rPr lang="en-US" sz="1600" dirty="0">
-                <a:solidFill>
-                  <a:schemeClr val="accent6">
-                    <a:lumMod val="60000"/>
-                    <a:lumOff val="40000"/>
-                  </a:schemeClr>
-                </a:solidFill>
-              </a:rPr>
-              <a:t>.</a:t>
-            </a:r>
-          </a:p>
-          <a:p>
-            <a:r>
-              <a:rPr lang="en-US" sz="1600" b="1" dirty="0"/>
-              <a:t>Narrator</a:t>
+              <a:t>NVDA</a:t>
             </a:r>
             <a:r>
               <a:rPr lang="en-US" sz="1600" dirty="0"/>
-              <a:t> – screen reader built-in to Windows.</a:t>
+              <a:t> – free, open-sourced screen reader</a:t>
             </a:r>
           </a:p>
           <a:p>
             <a:pPr lvl="1"/>
             <a:r>
               <a:rPr lang="en-US" sz="1600" dirty="0"/>
-              <a:t>View keyboard shortcuts for Narrator in the Deque article entitled </a:t>
+              <a:t>View keyboard shortcuts on at the Deque article entitled: </a:t>
             </a:r>
             <a:r>
               <a:rPr lang="en-US" sz="1600" b="1" dirty="0">
@@ -14876,7 +14851,7 @@
                   </a:extLst>
                 </a:hlinkClick>
               </a:rPr>
-              <a:t>Narrator Keyboard Shortcuts</a:t>
+              <a:t>NVDA Keyboard Shortcuts</a:t>
             </a:r>
             <a:r>
               <a:rPr lang="en-US" sz="1600" dirty="0">
@@ -14892,33 +14867,20 @@
           </a:p>
           <a:p>
             <a:r>
-              <a:rPr lang="en-US" sz="1600" b="1" dirty="0" err="1"/>
-              <a:t>VoiceOver</a:t>
-            </a:r>
-            <a:r>
               <a:rPr lang="en-US" sz="1600" b="1" dirty="0"/>
-              <a:t> </a:t>
+              <a:t>Narrator</a:t>
             </a:r>
             <a:r>
               <a:rPr lang="en-US" sz="1600" dirty="0"/>
-              <a:t>– is a built screen reader found on iOS and MacOS devices.</a:t>
-            </a:r>
-          </a:p>
-          <a:p>
-            <a:r>
-              <a:rPr lang="en-US" sz="1600" b="1" dirty="0" err="1"/>
-              <a:t>TalkBack</a:t>
-            </a:r>
-            <a:r>
-              <a:rPr lang="en-US" sz="1600" b="1" dirty="0"/>
-              <a:t> </a:t>
-            </a:r>
+              <a:t> – screen reader built-in to Windows.</a:t>
+            </a:r>
+          </a:p>
+          <a:p>
+            <a:pPr lvl="1"/>
             <a:r>
               <a:rPr lang="en-US" sz="1600" dirty="0"/>
-              <a:t>– is a built screen reader found on iOS and MacOS devices.</a:t>
-            </a:r>
-          </a:p>
-          <a:p>
+              <a:t>View keyboard shortcuts for Narrator in the Deque article entitled </a:t>
+            </a:r>
             <a:r>
               <a:rPr lang="en-US" sz="1600" b="1" dirty="0">
                 <a:solidFill>
@@ -14935,7 +14897,7 @@
                   </a:extLst>
                 </a:hlinkClick>
               </a:rPr>
-              <a:t>Microsoft Accessibility</a:t>
+              <a:t>Narrator Keyboard Shortcuts</a:t>
             </a:r>
             <a:r>
               <a:rPr lang="en-US" sz="1600" dirty="0">
@@ -14945,20 +14907,39 @@
                     <a:lumOff val="40000"/>
                   </a:schemeClr>
                 </a:solidFill>
-                <a:hlinkClick r:id="rId7">
-                  <a:extLst>
-                    <a:ext uri="{A12FA001-AC4F-418D-AE19-62706E023703}">
-                      <ahyp:hlinkClr xmlns:ahyp="http://schemas.microsoft.com/office/drawing/2018/hyperlinkcolor" val="tx"/>
-                    </a:ext>
-                  </a:extLst>
-                </a:hlinkClick>
               </a:rPr>
+              <a:t>.</a:t>
+            </a:r>
+          </a:p>
+          <a:p>
+            <a:r>
+              <a:rPr lang="en-US" sz="1600" b="1" dirty="0" err="1"/>
+              <a:t>VoiceOver</a:t>
+            </a:r>
+            <a:r>
+              <a:rPr lang="en-US" sz="1600" b="1" dirty="0"/>
               <a:t> </a:t>
             </a:r>
             <a:r>
               <a:rPr lang="en-US" sz="1600" dirty="0"/>
-              <a:t>on Twitter at </a:t>
-            </a:r>
+              <a:t>– is a built screen reader found on iOS and MacOS devices.</a:t>
+            </a:r>
+          </a:p>
+          <a:p>
+            <a:r>
+              <a:rPr lang="en-US" sz="1600" b="1" dirty="0" err="1"/>
+              <a:t>TalkBack</a:t>
+            </a:r>
+            <a:r>
+              <a:rPr lang="en-US" sz="1600" b="1" dirty="0"/>
+              <a:t> </a:t>
+            </a:r>
+            <a:r>
+              <a:rPr lang="en-US" sz="1600" dirty="0"/>
+              <a:t>– is a built screen reader found on iOS and MacOS devices.</a:t>
+            </a:r>
+          </a:p>
+          <a:p>
             <a:r>
               <a:rPr lang="en-US" sz="1600" b="1" dirty="0">
                 <a:solidFill>
@@ -14975,25 +14956,17 @@
                   </a:extLst>
                 </a:hlinkClick>
               </a:rPr>
-              <a:t>@MSFTEnable</a:t>
-            </a:r>
-            <a:r>
-              <a:rPr lang="en-US" sz="1600" b="1" dirty="0"/>
-              <a:t> </a:t>
-            </a:r>
-            <a:r>
-              <a:rPr lang="en-US" sz="1600" dirty="0"/>
-              <a:t>and at on the </a:t>
-            </a:r>
-            <a:r>
-              <a:rPr lang="en-US" sz="1600" b="1" dirty="0">
+              <a:t>Microsoft Accessibility</a:t>
+            </a:r>
+            <a:r>
+              <a:rPr lang="en-US" sz="1600" dirty="0">
                 <a:solidFill>
                   <a:schemeClr val="accent6">
                     <a:lumMod val="60000"/>
                     <a:lumOff val="40000"/>
                   </a:schemeClr>
                 </a:solidFill>
-                <a:hlinkClick r:id="rId7">
+                <a:hlinkClick r:id="rId8">
                   <a:extLst>
                     <a:ext uri="{A12FA001-AC4F-418D-AE19-62706E023703}">
                       <ahyp:hlinkClr xmlns:ahyp="http://schemas.microsoft.com/office/drawing/2018/hyperlinkcolor" val="tx"/>
@@ -15001,21 +14974,12 @@
                   </a:extLst>
                 </a:hlinkClick>
               </a:rPr>
-              <a:t>Microsoft Accessibility page</a:t>
-            </a:r>
-            <a:r>
-              <a:rPr lang="en-US" sz="1600" b="1" dirty="0">
-                <a:solidFill>
-                  <a:schemeClr val="accent6">
-                    <a:lumMod val="60000"/>
-                    <a:lumOff val="40000"/>
-                  </a:schemeClr>
-                </a:solidFill>
-              </a:rPr>
-              <a:t>.</a:t>
-            </a:r>
-          </a:p>
-          <a:p>
+              <a:t> </a:t>
+            </a:r>
+            <a:r>
+              <a:rPr lang="en-US" sz="1600" dirty="0"/>
+              <a:t>on Twitter at </a:t>
+            </a:r>
             <a:r>
               <a:rPr lang="en-US" sz="1600" b="1" dirty="0">
                 <a:solidFill>
@@ -15032,16 +14996,45 @@
                   </a:extLst>
                 </a:hlinkClick>
               </a:rPr>
-              <a:t>Microsoft Accessibility Fundamentals course</a:t>
-            </a:r>
-            <a:endParaRPr lang="en-US" sz="1600" b="1" dirty="0">
-              <a:solidFill>
-                <a:schemeClr val="accent6">
-                  <a:lumMod val="60000"/>
-                  <a:lumOff val="40000"/>
-                </a:schemeClr>
-              </a:solidFill>
-            </a:endParaRPr>
+              <a:t>@MSFTEnable</a:t>
+            </a:r>
+            <a:r>
+              <a:rPr lang="en-US" sz="1600" b="1" dirty="0"/>
+              <a:t> </a:t>
+            </a:r>
+            <a:r>
+              <a:rPr lang="en-US" sz="1600" dirty="0"/>
+              <a:t>and at on the </a:t>
+            </a:r>
+            <a:r>
+              <a:rPr lang="en-US" sz="1600" b="1" dirty="0">
+                <a:solidFill>
+                  <a:schemeClr val="accent6">
+                    <a:lumMod val="60000"/>
+                    <a:lumOff val="40000"/>
+                  </a:schemeClr>
+                </a:solidFill>
+                <a:hlinkClick r:id="rId8">
+                  <a:extLst>
+                    <a:ext uri="{A12FA001-AC4F-418D-AE19-62706E023703}">
+                      <ahyp:hlinkClr xmlns:ahyp="http://schemas.microsoft.com/office/drawing/2018/hyperlinkcolor" val="tx"/>
+                    </a:ext>
+                  </a:extLst>
+                </a:hlinkClick>
+              </a:rPr>
+              <a:t>Microsoft Accessibility page</a:t>
+            </a:r>
+            <a:r>
+              <a:rPr lang="en-US" sz="1600" b="1" dirty="0">
+                <a:solidFill>
+                  <a:schemeClr val="accent6">
+                    <a:lumMod val="60000"/>
+                    <a:lumOff val="40000"/>
+                  </a:schemeClr>
+                </a:solidFill>
+              </a:rPr>
+              <a:t>.</a:t>
+            </a:r>
           </a:p>
           <a:p>
             <a:r>
@@ -15060,6 +15053,34 @@
                   </a:extLst>
                 </a:hlinkClick>
               </a:rPr>
+              <a:t>Microsoft Accessibility Fundamentals course</a:t>
+            </a:r>
+            <a:endParaRPr lang="en-US" sz="1600" b="1" dirty="0">
+              <a:solidFill>
+                <a:schemeClr val="accent6">
+                  <a:lumMod val="60000"/>
+                  <a:lumOff val="40000"/>
+                </a:schemeClr>
+              </a:solidFill>
+            </a:endParaRPr>
+          </a:p>
+          <a:p>
+            <a:r>
+              <a:rPr lang="en-US" sz="1600" b="1" dirty="0">
+                <a:solidFill>
+                  <a:schemeClr val="accent6">
+                    <a:lumMod val="60000"/>
+                    <a:lumOff val="40000"/>
+                  </a:schemeClr>
+                </a:solidFill>
+                <a:hlinkClick r:id="rId11">
+                  <a:extLst>
+                    <a:ext uri="{A12FA001-AC4F-418D-AE19-62706E023703}">
+                      <ahyp:hlinkClr xmlns:ahyp="http://schemas.microsoft.com/office/drawing/2018/hyperlinkcolor" val="tx"/>
+                    </a:ext>
+                  </a:extLst>
+                </a:hlinkClick>
+              </a:rPr>
               <a:t>ANDI</a:t>
             </a:r>
             <a:r>
@@ -15080,7 +15101,7 @@
                     <a:lumOff val="40000"/>
                   </a:schemeClr>
                 </a:solidFill>
-                <a:hlinkClick r:id="rId11">
+                <a:hlinkClick r:id="rId12">
                   <a:extLst>
                     <a:ext uri="{A12FA001-AC4F-418D-AE19-62706E023703}">
                       <ahyp:hlinkClr xmlns:ahyp="http://schemas.microsoft.com/office/drawing/2018/hyperlinkcolor" val="tx"/>
@@ -15987,7 +16008,7 @@
         </p:spPr>
         <p:txBody>
           <a:bodyPr>
-            <a:normAutofit fontScale="85000" lnSpcReduction="20000"/>
+            <a:normAutofit fontScale="70000" lnSpcReduction="20000"/>
           </a:bodyPr>
           <a:lstStyle/>
           <a:p>
@@ -15999,105 +16020,119 @@
           <a:p>
             <a:pPr lvl="1"/>
             <a:r>
-              <a:rPr lang="en-US" dirty="0"/>
+              <a:rPr lang="en-US" sz="2100" dirty="0"/>
               <a:t>Web Content Accessibility Guidelines (WCAG)</a:t>
             </a:r>
           </a:p>
           <a:p>
             <a:pPr lvl="1"/>
             <a:r>
-              <a:rPr lang="en-US" dirty="0"/>
+              <a:rPr lang="en-US" sz="2100" dirty="0"/>
               <a:t>Authoring Tools Accessibility Guidelines (ATAG)</a:t>
             </a:r>
           </a:p>
           <a:p>
             <a:pPr lvl="1"/>
             <a:r>
-              <a:rPr lang="en-US" dirty="0"/>
+              <a:rPr lang="en-US" sz="2100" dirty="0"/>
               <a:t>User Agent Accessibility Guidelines (UAAG)</a:t>
             </a:r>
           </a:p>
           <a:p>
             <a:pPr lvl="1"/>
             <a:r>
-              <a:rPr lang="en-US" dirty="0"/>
+              <a:rPr lang="en-US" sz="2100" dirty="0"/>
               <a:t>Accessible Rich Internet Applications (ARIA)</a:t>
             </a:r>
           </a:p>
           <a:p>
             <a:pPr lvl="1"/>
             <a:r>
-              <a:rPr lang="en-US" dirty="0"/>
+              <a:rPr lang="en-US" sz="2100" dirty="0"/>
               <a:t>ISO/IEC Guide 71: Guide for addressing accessibility in standards</a:t>
             </a:r>
           </a:p>
           <a:p>
             <a:pPr lvl="1"/>
             <a:r>
-              <a:rPr lang="en-US" dirty="0"/>
+              <a:rPr lang="en-US" sz="2100" dirty="0"/>
               <a:t>ISO/TR 22411: Ergonomics data for use in the application of ISO/IEC Guide 71:2014</a:t>
             </a:r>
           </a:p>
           <a:p>
             <a:pPr lvl="1"/>
             <a:r>
-              <a:rPr lang="en-US" dirty="0"/>
+              <a:rPr lang="en-US" sz="2100" dirty="0"/>
               <a:t>ISO 30071-1: Digital accessibility standard</a:t>
             </a:r>
           </a:p>
           <a:p>
             <a:pPr lvl="1"/>
             <a:r>
-              <a:rPr lang="en-US" dirty="0"/>
+              <a:rPr lang="en-US" sz="2100" dirty="0"/>
               <a:t>ISO 21542: Building construction — Accessibility and usability of the built environment</a:t>
             </a:r>
           </a:p>
           <a:p>
             <a:pPr lvl="1"/>
             <a:r>
-              <a:rPr lang="en-US" dirty="0"/>
+              <a:rPr lang="en-US" sz="2100" dirty="0"/>
               <a:t>Accessible Electronic Documents Community of Practice (AED COP)</a:t>
             </a:r>
           </a:p>
           <a:p>
             <a:pPr lvl="1"/>
-            <a:endParaRPr lang="en-US" b="1" dirty="0"/>
-          </a:p>
-          <a:p>
-            <a:r>
-              <a:rPr lang="en-US" b="1" dirty="0"/>
+            <a:endParaRPr lang="en-US" sz="2100" b="1" dirty="0"/>
+          </a:p>
+          <a:p>
+            <a:r>
+              <a:rPr lang="en-US" sz="2100" b="1" dirty="0"/>
               <a:t>Regulations</a:t>
             </a:r>
           </a:p>
           <a:p>
             <a:pPr lvl="1"/>
             <a:r>
-              <a:rPr lang="en-US" dirty="0"/>
+              <a:rPr lang="en-US" sz="2100" dirty="0"/>
               <a:t>Equality Act of 2010 (UK)</a:t>
             </a:r>
           </a:p>
           <a:p>
             <a:pPr lvl="1"/>
             <a:r>
-              <a:rPr lang="en-US" dirty="0"/>
+              <a:rPr lang="en-US" sz="2100" dirty="0"/>
               <a:t>Web and Mobile Accessibility Directive (EU)</a:t>
             </a:r>
           </a:p>
           <a:p>
             <a:pPr lvl="1"/>
             <a:r>
-              <a:rPr lang="en-US" dirty="0"/>
+              <a:rPr lang="en-US" sz="2100" dirty="0"/>
               <a:t>Accessibility for Ontarians Act (AODA) (Canada)</a:t>
             </a:r>
           </a:p>
           <a:p>
             <a:pPr lvl="1"/>
             <a:r>
-              <a:rPr lang="en-US" dirty="0"/>
+              <a:rPr lang="en-US" sz="2100" dirty="0"/>
+              <a:t>Section 508 of the Rehabilitation Act and Section 255 of the Communications Act (USA)</a:t>
+            </a:r>
+          </a:p>
+          <a:p>
+            <a:pPr lvl="1"/>
+            <a:r>
+              <a:rPr lang="en-US" sz="2100" dirty="0"/>
+              <a:t>Americans with Disabilities Act (ADA) (USA)</a:t>
+            </a:r>
+          </a:p>
+          <a:p>
+            <a:pPr lvl="1"/>
+            <a:r>
+              <a:rPr lang="en-US" sz="2100" dirty="0"/>
               <a:t>Learn more at: </a:t>
             </a:r>
             <a:r>
-              <a:rPr lang="en-US" dirty="0">
+              <a:rPr lang="en-US" sz="2100" dirty="0">
                 <a:solidFill>
                   <a:schemeClr val="accent6">
                     <a:lumMod val="60000"/>
@@ -16114,7 +16149,7 @@
               </a:rPr>
               <a:t>Web Accessibility Laws &amp; Policies | Web Accessibility Initiative (WAI) | W3C</a:t>
             </a:r>
-            <a:endParaRPr lang="en-US" dirty="0">
+            <a:endParaRPr lang="en-US" sz="2100" dirty="0">
               <a:solidFill>
                 <a:schemeClr val="accent6">
                   <a:lumMod val="60000"/>

</xml_diff>

<commit_message>
Updated the London NDC presentation and then made a new version.
</commit_message>
<xml_diff>
--- a/Presenations/2024 Presentations/AccessibilityTesting101 - London NDC.pptx
+++ b/Presenations/2024 Presentations/AccessibilityTesting101 - London NDC.pptx
@@ -6028,7 +6028,7 @@
           <a:p>
             <a:fld id="{BEFAACEF-CC9A-483E-9B56-DECAFB57975A}" type="datetimeFigureOut">
               <a:rPr lang="en-US" smtClean="0"/>
-              <a:t>10/19/2023</a:t>
+              <a:t>1/29/2024</a:t>
             </a:fld>
             <a:endParaRPr lang="en-US"/>
           </a:p>
@@ -8173,7 +8173,7 @@
           <a:p>
             <a:fld id="{BA049CC4-5A97-47DC-86B9-9927E3A2D5F5}" type="datetime1">
               <a:rPr lang="en-US" smtClean="0"/>
-              <a:t>10/19/2023</a:t>
+              <a:t>1/29/2024</a:t>
             </a:fld>
             <a:endParaRPr lang="en-US"/>
           </a:p>
@@ -8445,7 +8445,7 @@
           <a:p>
             <a:fld id="{08A11C66-9C87-4BA8-9534-5EF145E66FE7}" type="datetime1">
               <a:rPr lang="en-US" smtClean="0"/>
-              <a:t>10/19/2023</a:t>
+              <a:t>1/29/2024</a:t>
             </a:fld>
             <a:endParaRPr lang="en-US"/>
           </a:p>
@@ -8676,7 +8676,7 @@
           <a:p>
             <a:fld id="{5AE480A1-3E8F-4FEB-9473-F28D5BA2CE2F}" type="datetime1">
               <a:rPr lang="en-US" smtClean="0"/>
-              <a:t>10/19/2023</a:t>
+              <a:t>1/29/2024</a:t>
             </a:fld>
             <a:endParaRPr lang="en-US"/>
           </a:p>
@@ -8986,7 +8986,7 @@
           <a:p>
             <a:fld id="{51941244-449B-4313-BB5D-CEC8D390AC83}" type="datetime1">
               <a:rPr lang="en-US" smtClean="0"/>
-              <a:t>10/19/2023</a:t>
+              <a:t>1/29/2024</a:t>
             </a:fld>
             <a:endParaRPr lang="en-US"/>
           </a:p>
@@ -9459,7 +9459,7 @@
           <a:p>
             <a:fld id="{D3AAB994-AF9D-407F-AC45-491F65672FB8}" type="datetime1">
               <a:rPr lang="en-US" smtClean="0"/>
-              <a:t>10/19/2023</a:t>
+              <a:t>1/29/2024</a:t>
             </a:fld>
             <a:endParaRPr lang="en-US"/>
           </a:p>
@@ -10006,7 +10006,7 @@
           <a:p>
             <a:fld id="{95B69CAA-71E9-4E32-8F4F-8B1877E6E416}" type="datetime1">
               <a:rPr lang="en-US" smtClean="0"/>
-              <a:t>10/19/2023</a:t>
+              <a:t>1/29/2024</a:t>
             </a:fld>
             <a:endParaRPr lang="en-US"/>
           </a:p>
@@ -10780,7 +10780,7 @@
           <a:p>
             <a:fld id="{4F1F7796-6626-4944-B793-E85205E429DA}" type="datetime1">
               <a:rPr lang="en-US" smtClean="0"/>
-              <a:t>10/19/2023</a:t>
+              <a:t>1/29/2024</a:t>
             </a:fld>
             <a:endParaRPr lang="en-US"/>
           </a:p>
@@ -10955,7 +10955,7 @@
           <a:p>
             <a:fld id="{275BEE86-0E69-41D4-B130-484F9582CF68}" type="datetime1">
               <a:rPr lang="en-US" smtClean="0"/>
-              <a:t>10/19/2023</a:t>
+              <a:t>1/29/2024</a:t>
             </a:fld>
             <a:endParaRPr lang="en-US"/>
           </a:p>
@@ -11178,7 +11178,7 @@
           <a:p>
             <a:fld id="{E8E2E543-8735-43A9-800E-D52D2E6A7570}" type="datetime1">
               <a:rPr lang="en-US" smtClean="0"/>
-              <a:t>10/19/2023</a:t>
+              <a:t>1/29/2024</a:t>
             </a:fld>
             <a:endParaRPr lang="en-US"/>
           </a:p>
@@ -11363,7 +11363,7 @@
           <a:p>
             <a:fld id="{4F562C0E-85F8-4032-A4AC-EAAA621EB697}" type="datetime1">
               <a:rPr lang="en-US" smtClean="0"/>
-              <a:t>10/19/2023</a:t>
+              <a:t>1/29/2024</a:t>
             </a:fld>
             <a:endParaRPr lang="en-US"/>
           </a:p>
@@ -11652,7 +11652,7 @@
           <a:p>
             <a:fld id="{4D4D2949-E030-4779-99B3-FAC018E20B72}" type="datetime1">
               <a:rPr lang="en-US" smtClean="0"/>
-              <a:t>10/19/2023</a:t>
+              <a:t>1/29/2024</a:t>
             </a:fld>
             <a:endParaRPr lang="en-US"/>
           </a:p>
@@ -11899,7 +11899,7 @@
           <a:p>
             <a:fld id="{0F3F8BCC-FB76-4EC4-8AAF-4B5BA4B75FEF}" type="datetime1">
               <a:rPr lang="en-US" smtClean="0"/>
-              <a:t>10/19/2023</a:t>
+              <a:t>1/29/2024</a:t>
             </a:fld>
             <a:endParaRPr lang="en-US"/>
           </a:p>
@@ -12278,7 +12278,7 @@
           <a:p>
             <a:fld id="{7AB60B1E-0147-4747-AD07-17141088A4C3}" type="datetime1">
               <a:rPr lang="en-US" smtClean="0"/>
-              <a:t>10/19/2023</a:t>
+              <a:t>1/29/2024</a:t>
             </a:fld>
             <a:endParaRPr lang="en-US"/>
           </a:p>
@@ -12396,7 +12396,7 @@
           <a:p>
             <a:fld id="{122DC7E5-9295-4EB3-8473-59EEBBFB2383}" type="datetime1">
               <a:rPr lang="en-US" smtClean="0"/>
-              <a:t>10/19/2023</a:t>
+              <a:t>1/29/2024</a:t>
             </a:fld>
             <a:endParaRPr lang="en-US"/>
           </a:p>
@@ -12491,7 +12491,7 @@
           <a:p>
             <a:fld id="{915BDD53-BBE8-4710-8261-574287A899BD}" type="datetime1">
               <a:rPr lang="en-US" smtClean="0"/>
-              <a:t>10/19/2023</a:t>
+              <a:t>1/29/2024</a:t>
             </a:fld>
             <a:endParaRPr lang="en-US"/>
           </a:p>
@@ -12740,7 +12740,7 @@
           <a:p>
             <a:fld id="{68C84FA3-F6D9-4634-9C02-2941F1994736}" type="datetime1">
               <a:rPr lang="en-US" smtClean="0"/>
-              <a:t>10/19/2023</a:t>
+              <a:t>1/29/2024</a:t>
             </a:fld>
             <a:endParaRPr lang="en-US"/>
           </a:p>
@@ -12997,7 +12997,7 @@
           <a:p>
             <a:fld id="{DAC35DB0-0D5A-4AF5-B91D-F5AC233569C2}" type="datetime1">
               <a:rPr lang="en-US" smtClean="0"/>
-              <a:t>10/19/2023</a:t>
+              <a:t>1/29/2024</a:t>
             </a:fld>
             <a:endParaRPr lang="en-US"/>
           </a:p>
@@ -13240,7 +13240,7 @@
           <a:p>
             <a:fld id="{22AFDDC1-071C-48BE-AEB0-C522838D21A3}" type="datetime1">
               <a:rPr lang="en-US" smtClean="0"/>
-              <a:t>10/19/2023</a:t>
+              <a:t>1/29/2024</a:t>
             </a:fld>
             <a:endParaRPr lang="en-US"/>
           </a:p>

</xml_diff>